<commit_message>
Animation Retargeting Tutorial Renewal
- Implementation of a system that
  detects nearby colliders and
  sends messages

- Fixed an issue where the
  animation speed increase button
  did not increase when pressing
  the button

- Utilize the dropdown to set the
  animator culling mode

- Delete and add resource data

- Each PPT data update
</commit_message>
<xml_diff>
--- a/Assets/Animator Controller/PPT Data/Animator Controller Example.pptx
+++ b/Assets/Animator Controller/PPT Data/Animator Controller Example.pptx
@@ -2,7 +2,7 @@
 <file path=ppt/presentation.xml><?xml version="1.0" encoding="utf-8"?>
 <p:presentation xmlns:a="http://schemas.openxmlformats.org/drawingml/2006/main" xmlns:r="http://schemas.openxmlformats.org/officeDocument/2006/relationships" xmlns:p="http://schemas.openxmlformats.org/presentationml/2006/main" xmlns:p14="http://schemas.microsoft.com/office/powerpoint/2010/main" saveSubsetFonts="1" firstSlideNum="0">
   <p:sldMasterIdLst>
-    <p:sldMasterId id="2147486329" r:id="rId12"/>
+    <p:sldMasterId id="2147486330" r:id="rId12"/>
   </p:sldMasterIdLst>
   <p:notesMasterIdLst>
     <p:notesMasterId r:id="rId14"/>
@@ -12,10 +12,10 @@
     <p:sldId id="318" r:id="rId18"/>
     <p:sldId id="316" r:id="rId20"/>
     <p:sldId id="297" r:id="rId22"/>
-    <p:sldId id="319" r:id="rId24"/>
-    <p:sldId id="321" r:id="rId26"/>
+    <p:sldId id="319" r:id="rId23"/>
+    <p:sldId id="321" r:id="rId25"/>
     <p:sldId id="322" r:id="rId27"/>
-    <p:sldId id="320" r:id="rId28"/>
+    <p:sldId id="320" r:id="rId29"/>
   </p:sldIdLst>
   <p:sldSz cx="12192000" cy="6858000"/>
   <p:notesSz cx="6858000" cy="9144000"/>
@@ -8548,9 +8548,9 @@
           <p:nvPr/>
         </p:nvSpPr>
         <p:spPr>
-          <a:xfrm>
+          <a:xfrm rot="0">
             <a:off x="1240790" y="4378960"/>
-            <a:ext cx="4126865" cy="1784985"/>
+            <a:ext cx="4117975" cy="1784985"/>
           </a:xfrm>
           <a:prstGeom prst="rect"/>
           <a:noFill/>
@@ -8741,7 +8741,7 @@
       </p:pic>
       <p:pic>
         <p:nvPicPr>
-          <p:cNvPr id="1180" name="그림 1" descr="C:/Users/Admin1/AppData/Roaming/PolarisOffice/ETemp/24900_16569248/fImage2242713841.png"/>
+          <p:cNvPr id="1180" name="그림 1"/>
           <p:cNvPicPr>
             <a:picLocks noChangeAspect="1"/>
           </p:cNvPicPr>
@@ -8892,7 +8892,7 @@
       </p:sp>
       <p:pic>
         <p:nvPicPr>
-          <p:cNvPr id="1182" name="그림 5" descr="C:/Users/Admin1/AppData/Roaming/PolarisOffice/ETemp/24900_16569248/fImage94281408467.png"/>
+          <p:cNvPr id="1182" name="그림 5"/>
           <p:cNvPicPr>
             <a:picLocks noChangeAspect="1"/>
           </p:cNvPicPr>

</xml_diff>